<commit_message>
add related apps slides
</commit_message>
<xml_diff>
--- a/usabilityEngineering/A1/MaS_literatureResearch.pptx
+++ b/usabilityEngineering/A1/MaS_literatureResearch.pptx
@@ -6,8 +6,8 @@
   </p:sldMasterIdLst>
   <p:sldIdLst>
     <p:sldId id="256" r:id="rId2"/>
-    <p:sldId id="259" r:id="rId3"/>
-    <p:sldId id="260" r:id="rId4"/>
+    <p:sldId id="260" r:id="rId3"/>
+    <p:sldId id="261" r:id="rId4"/>
   </p:sldIdLst>
   <p:sldSz cx="12192000" cy="6858000"/>
   <p:notesSz cx="6858000" cy="9144000"/>
@@ -106,6 +106,11 @@
       </a:defRPr>
     </a:lvl9pPr>
   </p:defaultTextStyle>
+  <p:extLst>
+    <p:ext uri="{EFAFB233-063F-42B5-8137-9DF3F51BA10A}">
+      <p15:sldGuideLst xmlns:p15="http://schemas.microsoft.com/office/powerpoint/2012/main"/>
+    </p:ext>
+  </p:extLst>
 </p:presentation>
 </file>
 
@@ -305,7 +310,7 @@
           <a:p>
             <a:fld id="{96DFF08F-DC6B-4601-B491-B0F83F6DD2DA}" type="datetimeFigureOut">
               <a:rPr lang="en-US" dirty="0"/>
-              <a:t>11/8/2016</a:t>
+              <a:t>11/9/2016</a:t>
             </a:fld>
             <a:endParaRPr lang="en-US" dirty="0"/>
           </a:p>
@@ -521,7 +526,7 @@
           <a:p>
             <a:fld id="{96DFF08F-DC6B-4601-B491-B0F83F6DD2DA}" type="datetimeFigureOut">
               <a:rPr lang="en-US" dirty="0"/>
-              <a:t>11/8/2016</a:t>
+              <a:t>11/9/2016</a:t>
             </a:fld>
             <a:endParaRPr lang="en-US" dirty="0"/>
           </a:p>
@@ -696,7 +701,7 @@
           <a:p>
             <a:fld id="{96DFF08F-DC6B-4601-B491-B0F83F6DD2DA}" type="datetimeFigureOut">
               <a:rPr lang="en-US" dirty="0"/>
-              <a:t>11/8/2016</a:t>
+              <a:t>11/9/2016</a:t>
             </a:fld>
             <a:endParaRPr lang="en-US" dirty="0"/>
           </a:p>
@@ -861,7 +866,7 @@
           <a:p>
             <a:fld id="{96DFF08F-DC6B-4601-B491-B0F83F6DD2DA}" type="datetimeFigureOut">
               <a:rPr lang="en-US" dirty="0"/>
-              <a:t>11/8/2016</a:t>
+              <a:t>11/9/2016</a:t>
             </a:fld>
             <a:endParaRPr lang="en-US" dirty="0"/>
           </a:p>
@@ -1107,7 +1112,7 @@
           <a:p>
             <a:fld id="{96DFF08F-DC6B-4601-B491-B0F83F6DD2DA}" type="datetimeFigureOut">
               <a:rPr lang="en-US" dirty="0"/>
-              <a:t>11/8/2016</a:t>
+              <a:t>11/9/2016</a:t>
             </a:fld>
             <a:endParaRPr lang="en-US" dirty="0"/>
           </a:p>
@@ -1425,7 +1430,7 @@
           <a:p>
             <a:fld id="{96DFF08F-DC6B-4601-B491-B0F83F6DD2DA}" type="datetimeFigureOut">
               <a:rPr lang="en-US" dirty="0"/>
-              <a:t>11/8/2016</a:t>
+              <a:t>11/9/2016</a:t>
             </a:fld>
             <a:endParaRPr lang="en-US" dirty="0"/>
           </a:p>
@@ -1844,7 +1849,7 @@
           <a:p>
             <a:fld id="{96DFF08F-DC6B-4601-B491-B0F83F6DD2DA}" type="datetimeFigureOut">
               <a:rPr lang="en-US" dirty="0"/>
-              <a:t>11/8/2016</a:t>
+              <a:t>11/9/2016</a:t>
             </a:fld>
             <a:endParaRPr lang="en-US" dirty="0"/>
           </a:p>
@@ -1957,7 +1962,7 @@
           <a:p>
             <a:fld id="{96DFF08F-DC6B-4601-B491-B0F83F6DD2DA}" type="datetimeFigureOut">
               <a:rPr lang="en-US" dirty="0"/>
-              <a:t>11/8/2016</a:t>
+              <a:t>11/9/2016</a:t>
             </a:fld>
             <a:endParaRPr lang="en-US" dirty="0"/>
           </a:p>
@@ -2047,7 +2052,7 @@
           <a:p>
             <a:fld id="{96DFF08F-DC6B-4601-B491-B0F83F6DD2DA}" type="datetimeFigureOut">
               <a:rPr lang="en-US" dirty="0"/>
-              <a:t>11/8/2016</a:t>
+              <a:t>11/9/2016</a:t>
             </a:fld>
             <a:endParaRPr lang="en-US" dirty="0"/>
           </a:p>
@@ -2332,7 +2337,7 @@
           <a:p>
             <a:fld id="{96DFF08F-DC6B-4601-B491-B0F83F6DD2DA}" type="datetimeFigureOut">
               <a:rPr lang="en-US" dirty="0"/>
-              <a:t>11/8/2016</a:t>
+              <a:t>11/9/2016</a:t>
             </a:fld>
             <a:endParaRPr lang="en-US" dirty="0"/>
           </a:p>
@@ -2599,7 +2604,7 @@
           <a:p>
             <a:fld id="{96DFF08F-DC6B-4601-B491-B0F83F6DD2DA}" type="datetimeFigureOut">
               <a:rPr lang="en-US" dirty="0"/>
-              <a:t>11/8/2016</a:t>
+              <a:t>11/9/2016</a:t>
             </a:fld>
             <a:endParaRPr lang="en-US" dirty="0"/>
           </a:p>
@@ -2849,7 +2854,7 @@
             <a:fld id="{96DFF08F-DC6B-4601-B491-B0F83F6DD2DA}" type="datetimeFigureOut">
               <a:rPr lang="en-US" dirty="0"/>
               <a:pPr/>
-              <a:t>11/8/2016</a:t>
+              <a:t>11/9/2016</a:t>
             </a:fld>
             <a:endParaRPr lang="en-US" dirty="0"/>
           </a:p>
@@ -3322,22 +3327,12 @@
           <a:lstStyle/>
           <a:p>
             <a:r>
-              <a:rPr lang="de-DE" sz="2400" dirty="0" err="1"/>
-              <a:t>Literature</a:t>
-            </a:r>
-            <a:br>
-              <a:rPr lang="de-DE" sz="2400" dirty="0"/>
-            </a:br>
-            <a:r>
-              <a:rPr lang="de-DE" sz="2400" dirty="0"/>
-              <a:t>-</a:t>
-            </a:r>
-            <a:br>
+              <a:rPr lang="de-DE" dirty="0" err="1"/>
+              <a:t>Related</a:t>
+            </a:r>
+            <a:r>
               <a:rPr lang="de-DE" dirty="0"/>
-            </a:br>
-            <a:r>
-              <a:rPr lang="de-DE" dirty="0"/>
-              <a:t>Research</a:t>
+              <a:t> Apps</a:t>
             </a:r>
           </a:p>
         </p:txBody>
@@ -3461,18 +3456,9 @@
           <a:lstStyle/>
           <a:p>
             <a:r>
-              <a:rPr lang="de-DE" dirty="0" err="1"/>
-              <a:t>Example</a:t>
-            </a:r>
-            <a:r>
-              <a:rPr lang="de-DE" dirty="0"/>
-              <a:t> </a:t>
-            </a:r>
-            <a:r>
-              <a:rPr lang="de-DE" dirty="0" err="1"/>
-              <a:t>slide</a:t>
-            </a:r>
-            <a:endParaRPr lang="de-DE" dirty="0"/>
+              <a:rPr lang="en-US" dirty="0"/>
+              <a:t>List Apps</a:t>
+            </a:r>
           </a:p>
         </p:txBody>
       </p:sp>
@@ -3489,7 +3475,7 @@
         <p:spPr>
           <a:xfrm>
             <a:off x="1143000" y="2001511"/>
-            <a:ext cx="7296150" cy="756000"/>
+            <a:ext cx="4699000" cy="756000"/>
           </a:xfrm>
         </p:spPr>
         <p:txBody>
@@ -3497,14 +3483,14 @@
           <a:lstStyle/>
           <a:p>
             <a:r>
-              <a:rPr lang="de-DE" dirty="0">
+              <a:rPr lang="en-US" dirty="0">
                 <a:solidFill>
                   <a:schemeClr val="accent4">
                     <a:lumMod val="75000"/>
                   </a:schemeClr>
                 </a:solidFill>
               </a:rPr>
-              <a:t>Das Template</a:t>
+              <a:t>Wunderlist</a:t>
             </a:r>
           </a:p>
         </p:txBody>
@@ -3522,7 +3508,7 @@
         <p:spPr>
           <a:xfrm>
             <a:off x="1143000" y="2721483"/>
-            <a:ext cx="8210550" cy="1332000"/>
+            <a:ext cx="4461933" cy="1332000"/>
           </a:xfrm>
         </p:spPr>
         <p:txBody>
@@ -3530,22 +3516,22 @@
           <a:lstStyle/>
           <a:p>
             <a:r>
-              <a:rPr lang="de-DE" dirty="0"/>
-              <a:t>Das </a:t>
-            </a:r>
-            <a:r>
-              <a:rPr lang="de-DE" dirty="0" err="1"/>
-              <a:t>template</a:t>
-            </a:r>
-            <a:r>
-              <a:rPr lang="de-DE" dirty="0"/>
-              <a:t> zum Ausfüllen findet ihr auf der nächsten Seite</a:t>
-            </a:r>
-          </a:p>
-          <a:p>
-            <a:r>
-              <a:rPr lang="de-DE" dirty="0"/>
-              <a:t>Das ist super. </a:t>
+              <a:rPr lang="en-US" dirty="0"/>
+              <a:t>General </a:t>
+            </a:r>
+            <a:r>
+              <a:rPr lang="en-US" dirty="0" err="1"/>
+              <a:t>toDo</a:t>
+            </a:r>
+            <a:r>
+              <a:rPr lang="en-US" dirty="0"/>
+              <a:t> list with shared lists</a:t>
+            </a:r>
+          </a:p>
+          <a:p>
+            <a:r>
+              <a:rPr lang="en-US" dirty="0"/>
+              <a:t> no product database or categories</a:t>
             </a:r>
           </a:p>
         </p:txBody>
@@ -3563,7 +3549,7 @@
         <p:spPr>
           <a:xfrm>
             <a:off x="1143000" y="4395455"/>
-            <a:ext cx="7296150" cy="756000"/>
+            <a:ext cx="4461933" cy="756000"/>
           </a:xfrm>
         </p:spPr>
         <p:txBody>
@@ -3571,14 +3557,14 @@
           <a:lstStyle/>
           <a:p>
             <a:r>
-              <a:rPr lang="de-DE" dirty="0">
+              <a:rPr lang="en-US" dirty="0">
                 <a:solidFill>
                   <a:schemeClr val="accent4">
                     <a:lumMod val="75000"/>
                   </a:schemeClr>
                 </a:solidFill>
               </a:rPr>
-              <a:t>Die Sprache</a:t>
+              <a:t>Out of Milk</a:t>
             </a:r>
           </a:p>
         </p:txBody>
@@ -3596,32 +3582,22 @@
         <p:spPr>
           <a:xfrm>
             <a:off x="1143000" y="5115425"/>
-            <a:ext cx="8210550" cy="1332000"/>
+            <a:ext cx="4969933" cy="1332000"/>
           </a:xfrm>
         </p:spPr>
         <p:txBody>
-          <a:bodyPr>
-            <a:normAutofit/>
-          </a:bodyPr>
-          <a:lstStyle/>
-          <a:p>
-            <a:r>
-              <a:rPr lang="de-DE" dirty="0"/>
-              <a:t>Ilhan wünscht sich englische Doku. Das ist blöd</a:t>
-            </a:r>
-          </a:p>
-          <a:p>
-            <a:r>
-              <a:rPr lang="de-DE" dirty="0"/>
-              <a:t>Aber man kann ja auch Bilder zum Veranschaulichen verwenden anstatt </a:t>
-            </a:r>
-            <a:r>
-              <a:rPr lang="de-DE" dirty="0" err="1"/>
-              <a:t>text</a:t>
-            </a:r>
-            <a:r>
-              <a:rPr lang="de-DE" dirty="0"/>
-              <a:t>.</a:t>
+          <a:bodyPr/>
+          <a:lstStyle/>
+          <a:p>
+            <a:r>
+              <a:rPr lang="en-US" dirty="0"/>
+              <a:t>Shared lists and product categories</a:t>
+            </a:r>
+          </a:p>
+          <a:p>
+            <a:r>
+              <a:rPr lang="en-US" dirty="0"/>
+              <a:t>Prices have to be added manually</a:t>
             </a:r>
           </a:p>
         </p:txBody>
@@ -3674,10 +3650,575 @@
           </a:extLst>
         </p:spPr>
       </p:pic>
+      <p:sp>
+        <p:nvSpPr>
+          <p:cNvPr id="8" name="Textplatzhalter 2"/>
+          <p:cNvSpPr txBox="1">
+            <a:spLocks/>
+          </p:cNvSpPr>
+          <p:nvPr/>
+        </p:nvSpPr>
+        <p:spPr>
+          <a:xfrm>
+            <a:off x="6883400" y="1965960"/>
+            <a:ext cx="4699000" cy="756000"/>
+          </a:xfrm>
+          <a:prstGeom prst="rect">
+            <a:avLst/>
+          </a:prstGeom>
+        </p:spPr>
+        <p:txBody>
+          <a:bodyPr vert="horz" lIns="91440" tIns="45720" rIns="91440" bIns="45720" rtlCol="0" anchor="ctr">
+            <a:normAutofit/>
+          </a:bodyPr>
+          <a:lstStyle>
+            <a:lvl1pPr marL="0" indent="0" algn="l" defTabSz="914400" rtl="0" eaLnBrk="1" latinLnBrk="0" hangingPunct="1">
+              <a:lnSpc>
+                <a:spcPct val="90000"/>
+              </a:lnSpc>
+              <a:spcBef>
+                <a:spcPts val="0"/>
+              </a:spcBef>
+              <a:buClr>
+                <a:schemeClr val="accent1"/>
+              </a:buClr>
+              <a:buSzPct val="80000"/>
+              <a:buFont typeface="Corbel" pitchFamily="34" charset="0"/>
+              <a:buNone/>
+              <a:defRPr sz="2400" b="1" kern="1200">
+                <a:solidFill>
+                  <a:schemeClr val="accent1"/>
+                </a:solidFill>
+                <a:latin typeface="+mn-lt"/>
+                <a:ea typeface="+mn-ea"/>
+                <a:cs typeface="+mn-cs"/>
+              </a:defRPr>
+            </a:lvl1pPr>
+            <a:lvl2pPr marL="457200" indent="0" algn="l" defTabSz="914400" rtl="0" eaLnBrk="1" latinLnBrk="0" hangingPunct="1">
+              <a:lnSpc>
+                <a:spcPct val="90000"/>
+              </a:lnSpc>
+              <a:spcBef>
+                <a:spcPts val="200"/>
+              </a:spcBef>
+              <a:spcAft>
+                <a:spcPts val="400"/>
+              </a:spcAft>
+              <a:buClr>
+                <a:schemeClr val="accent1"/>
+              </a:buClr>
+              <a:buSzPct val="80000"/>
+              <a:buFont typeface="Corbel" pitchFamily="34" charset="0"/>
+              <a:buNone/>
+              <a:defRPr sz="2000" b="1" kern="1200">
+                <a:solidFill>
+                  <a:schemeClr val="accent1"/>
+                </a:solidFill>
+                <a:latin typeface="+mn-lt"/>
+                <a:ea typeface="+mn-ea"/>
+                <a:cs typeface="+mn-cs"/>
+              </a:defRPr>
+            </a:lvl2pPr>
+            <a:lvl3pPr marL="914400" indent="0" algn="l" defTabSz="914400" rtl="0" eaLnBrk="1" latinLnBrk="0" hangingPunct="1">
+              <a:lnSpc>
+                <a:spcPct val="90000"/>
+              </a:lnSpc>
+              <a:spcBef>
+                <a:spcPts val="200"/>
+              </a:spcBef>
+              <a:spcAft>
+                <a:spcPts val="400"/>
+              </a:spcAft>
+              <a:buClr>
+                <a:schemeClr val="accent1"/>
+              </a:buClr>
+              <a:buSzPct val="80000"/>
+              <a:buFont typeface="Corbel" pitchFamily="34" charset="0"/>
+              <a:buNone/>
+              <a:defRPr sz="1800" b="1" kern="1200">
+                <a:solidFill>
+                  <a:schemeClr val="accent1"/>
+                </a:solidFill>
+                <a:latin typeface="+mn-lt"/>
+                <a:ea typeface="+mn-ea"/>
+                <a:cs typeface="+mn-cs"/>
+              </a:defRPr>
+            </a:lvl3pPr>
+            <a:lvl4pPr marL="1371600" indent="0" algn="l" defTabSz="914400" rtl="0" eaLnBrk="1" latinLnBrk="0" hangingPunct="1">
+              <a:lnSpc>
+                <a:spcPct val="90000"/>
+              </a:lnSpc>
+              <a:spcBef>
+                <a:spcPts val="200"/>
+              </a:spcBef>
+              <a:spcAft>
+                <a:spcPts val="400"/>
+              </a:spcAft>
+              <a:buClr>
+                <a:schemeClr val="accent1"/>
+              </a:buClr>
+              <a:buSzPct val="80000"/>
+              <a:buFont typeface="Corbel" pitchFamily="34" charset="0"/>
+              <a:buNone/>
+              <a:defRPr sz="1600" b="1" kern="1200">
+                <a:solidFill>
+                  <a:schemeClr val="accent1"/>
+                </a:solidFill>
+                <a:latin typeface="+mn-lt"/>
+                <a:ea typeface="+mn-ea"/>
+                <a:cs typeface="+mn-cs"/>
+              </a:defRPr>
+            </a:lvl4pPr>
+            <a:lvl5pPr marL="1828800" indent="0" algn="l" defTabSz="914400" rtl="0" eaLnBrk="1" latinLnBrk="0" hangingPunct="1">
+              <a:lnSpc>
+                <a:spcPct val="90000"/>
+              </a:lnSpc>
+              <a:spcBef>
+                <a:spcPts val="200"/>
+              </a:spcBef>
+              <a:spcAft>
+                <a:spcPts val="400"/>
+              </a:spcAft>
+              <a:buClr>
+                <a:schemeClr val="accent1"/>
+              </a:buClr>
+              <a:buSzPct val="80000"/>
+              <a:buFont typeface="Corbel" pitchFamily="34" charset="0"/>
+              <a:buNone/>
+              <a:defRPr sz="1600" b="1" kern="1200">
+                <a:solidFill>
+                  <a:schemeClr val="accent1"/>
+                </a:solidFill>
+                <a:latin typeface="+mn-lt"/>
+                <a:ea typeface="+mn-ea"/>
+                <a:cs typeface="+mn-cs"/>
+              </a:defRPr>
+            </a:lvl5pPr>
+            <a:lvl6pPr marL="2286000" indent="0" algn="l" defTabSz="914400" rtl="0" eaLnBrk="1" latinLnBrk="0" hangingPunct="1">
+              <a:lnSpc>
+                <a:spcPct val="90000"/>
+              </a:lnSpc>
+              <a:spcBef>
+                <a:spcPts val="200"/>
+              </a:spcBef>
+              <a:spcAft>
+                <a:spcPts val="400"/>
+              </a:spcAft>
+              <a:buClr>
+                <a:schemeClr val="accent1"/>
+              </a:buClr>
+              <a:buSzPct val="80000"/>
+              <a:buFont typeface="Corbel" pitchFamily="34" charset="0"/>
+              <a:buNone/>
+              <a:defRPr sz="1600" b="1" kern="1200">
+                <a:solidFill>
+                  <a:schemeClr val="accent1"/>
+                </a:solidFill>
+                <a:latin typeface="+mn-lt"/>
+                <a:ea typeface="+mn-ea"/>
+                <a:cs typeface="+mn-cs"/>
+              </a:defRPr>
+            </a:lvl6pPr>
+            <a:lvl7pPr marL="2743200" indent="0" algn="l" defTabSz="914400" rtl="0" eaLnBrk="1" latinLnBrk="0" hangingPunct="1">
+              <a:lnSpc>
+                <a:spcPct val="90000"/>
+              </a:lnSpc>
+              <a:spcBef>
+                <a:spcPts val="200"/>
+              </a:spcBef>
+              <a:spcAft>
+                <a:spcPts val="400"/>
+              </a:spcAft>
+              <a:buClr>
+                <a:schemeClr val="accent1"/>
+              </a:buClr>
+              <a:buSzPct val="80000"/>
+              <a:buFont typeface="Corbel" pitchFamily="34" charset="0"/>
+              <a:buNone/>
+              <a:defRPr sz="1600" b="1" kern="1200">
+                <a:solidFill>
+                  <a:schemeClr val="accent1"/>
+                </a:solidFill>
+                <a:latin typeface="+mn-lt"/>
+                <a:ea typeface="+mn-ea"/>
+                <a:cs typeface="+mn-cs"/>
+              </a:defRPr>
+            </a:lvl7pPr>
+            <a:lvl8pPr marL="3200400" indent="0" algn="l" defTabSz="914400" rtl="0" eaLnBrk="1" latinLnBrk="0" hangingPunct="1">
+              <a:lnSpc>
+                <a:spcPct val="90000"/>
+              </a:lnSpc>
+              <a:spcBef>
+                <a:spcPts val="200"/>
+              </a:spcBef>
+              <a:spcAft>
+                <a:spcPts val="400"/>
+              </a:spcAft>
+              <a:buClr>
+                <a:schemeClr val="accent1"/>
+              </a:buClr>
+              <a:buSzPct val="80000"/>
+              <a:buFont typeface="Corbel" pitchFamily="34" charset="0"/>
+              <a:buNone/>
+              <a:defRPr sz="1600" b="1" kern="1200">
+                <a:solidFill>
+                  <a:schemeClr val="accent1"/>
+                </a:solidFill>
+                <a:latin typeface="+mn-lt"/>
+                <a:ea typeface="+mn-ea"/>
+                <a:cs typeface="+mn-cs"/>
+              </a:defRPr>
+            </a:lvl8pPr>
+            <a:lvl9pPr marL="3657600" indent="0" algn="l" defTabSz="914400" rtl="0" eaLnBrk="1" latinLnBrk="0" hangingPunct="1">
+              <a:lnSpc>
+                <a:spcPct val="90000"/>
+              </a:lnSpc>
+              <a:spcBef>
+                <a:spcPts val="200"/>
+              </a:spcBef>
+              <a:spcAft>
+                <a:spcPts val="400"/>
+              </a:spcAft>
+              <a:buClr>
+                <a:schemeClr val="accent1"/>
+              </a:buClr>
+              <a:buSzPct val="80000"/>
+              <a:buFont typeface="Corbel" pitchFamily="34" charset="0"/>
+              <a:buNone/>
+              <a:defRPr sz="1600" b="1" kern="1200">
+                <a:solidFill>
+                  <a:schemeClr val="accent1"/>
+                </a:solidFill>
+                <a:latin typeface="+mn-lt"/>
+                <a:ea typeface="+mn-ea"/>
+                <a:cs typeface="+mn-cs"/>
+              </a:defRPr>
+            </a:lvl9pPr>
+          </a:lstStyle>
+          <a:p>
+            <a:r>
+              <a:rPr lang="en-US" dirty="0" err="1">
+                <a:solidFill>
+                  <a:schemeClr val="accent4">
+                    <a:lumMod val="75000"/>
+                  </a:schemeClr>
+                </a:solidFill>
+              </a:rPr>
+              <a:t>Einkaufsliste</a:t>
+            </a:r>
+            <a:endParaRPr lang="en-US" dirty="0">
+              <a:solidFill>
+                <a:schemeClr val="accent4">
+                  <a:lumMod val="75000"/>
+                </a:schemeClr>
+              </a:solidFill>
+            </a:endParaRPr>
+          </a:p>
+        </p:txBody>
+      </p:sp>
+      <p:sp>
+        <p:nvSpPr>
+          <p:cNvPr id="9" name="Inhaltsplatzhalter 5"/>
+          <p:cNvSpPr txBox="1">
+            <a:spLocks/>
+          </p:cNvSpPr>
+          <p:nvPr/>
+        </p:nvSpPr>
+        <p:spPr>
+          <a:xfrm>
+            <a:off x="6883400" y="2656320"/>
+            <a:ext cx="4969933" cy="1332000"/>
+          </a:xfrm>
+          <a:prstGeom prst="rect">
+            <a:avLst/>
+          </a:prstGeom>
+        </p:spPr>
+        <p:txBody>
+          <a:bodyPr vert="horz" lIns="91440" tIns="45720" rIns="91440" bIns="45720" rtlCol="0">
+            <a:normAutofit/>
+          </a:bodyPr>
+          <a:lstStyle>
+            <a:lvl1pPr marL="228600" indent="-182880" algn="l" defTabSz="914400" rtl="0" eaLnBrk="1" latinLnBrk="0" hangingPunct="1">
+              <a:lnSpc>
+                <a:spcPct val="90000"/>
+              </a:lnSpc>
+              <a:spcBef>
+                <a:spcPts val="1400"/>
+              </a:spcBef>
+              <a:buClr>
+                <a:schemeClr val="accent1"/>
+              </a:buClr>
+              <a:buSzPct val="80000"/>
+              <a:buFont typeface="Corbel" pitchFamily="34" charset="0"/>
+              <a:buChar char="•"/>
+              <a:defRPr sz="2200" kern="1200">
+                <a:solidFill>
+                  <a:schemeClr val="accent1"/>
+                </a:solidFill>
+                <a:latin typeface="+mn-lt"/>
+                <a:ea typeface="+mn-ea"/>
+                <a:cs typeface="+mn-cs"/>
+              </a:defRPr>
+            </a:lvl1pPr>
+            <a:lvl2pPr marL="457200" indent="-182880" algn="l" defTabSz="914400" rtl="0" eaLnBrk="1" latinLnBrk="0" hangingPunct="1">
+              <a:lnSpc>
+                <a:spcPct val="90000"/>
+              </a:lnSpc>
+              <a:spcBef>
+                <a:spcPts val="200"/>
+              </a:spcBef>
+              <a:spcAft>
+                <a:spcPts val="400"/>
+              </a:spcAft>
+              <a:buClr>
+                <a:schemeClr val="accent1"/>
+              </a:buClr>
+              <a:buSzPct val="80000"/>
+              <a:buFont typeface="Corbel" pitchFamily="34" charset="0"/>
+              <a:buChar char="•"/>
+              <a:defRPr sz="2000" kern="1200">
+                <a:solidFill>
+                  <a:schemeClr val="accent1"/>
+                </a:solidFill>
+                <a:latin typeface="+mn-lt"/>
+                <a:ea typeface="+mn-ea"/>
+                <a:cs typeface="+mn-cs"/>
+              </a:defRPr>
+            </a:lvl2pPr>
+            <a:lvl3pPr marL="731520" indent="-182880" algn="l" defTabSz="914400" rtl="0" eaLnBrk="1" latinLnBrk="0" hangingPunct="1">
+              <a:lnSpc>
+                <a:spcPct val="90000"/>
+              </a:lnSpc>
+              <a:spcBef>
+                <a:spcPts val="200"/>
+              </a:spcBef>
+              <a:spcAft>
+                <a:spcPts val="400"/>
+              </a:spcAft>
+              <a:buClr>
+                <a:schemeClr val="accent1"/>
+              </a:buClr>
+              <a:buSzPct val="80000"/>
+              <a:buFont typeface="Corbel" pitchFamily="34" charset="0"/>
+              <a:buChar char="•"/>
+              <a:defRPr sz="1800" kern="1200">
+                <a:solidFill>
+                  <a:schemeClr val="accent1"/>
+                </a:solidFill>
+                <a:latin typeface="+mn-lt"/>
+                <a:ea typeface="+mn-ea"/>
+                <a:cs typeface="+mn-cs"/>
+              </a:defRPr>
+            </a:lvl3pPr>
+            <a:lvl4pPr marL="1005840" indent="-182880" algn="l" defTabSz="914400" rtl="0" eaLnBrk="1" latinLnBrk="0" hangingPunct="1">
+              <a:lnSpc>
+                <a:spcPct val="90000"/>
+              </a:lnSpc>
+              <a:spcBef>
+                <a:spcPts val="200"/>
+              </a:spcBef>
+              <a:spcAft>
+                <a:spcPts val="400"/>
+              </a:spcAft>
+              <a:buClr>
+                <a:schemeClr val="accent1"/>
+              </a:buClr>
+              <a:buSzPct val="80000"/>
+              <a:buFont typeface="Corbel" pitchFamily="34" charset="0"/>
+              <a:buChar char="•"/>
+              <a:defRPr sz="1600" kern="1200">
+                <a:solidFill>
+                  <a:schemeClr val="accent1"/>
+                </a:solidFill>
+                <a:latin typeface="+mn-lt"/>
+                <a:ea typeface="+mn-ea"/>
+                <a:cs typeface="+mn-cs"/>
+              </a:defRPr>
+            </a:lvl4pPr>
+            <a:lvl5pPr marL="1280160" indent="-182880" algn="l" defTabSz="914400" rtl="0" eaLnBrk="1" latinLnBrk="0" hangingPunct="1">
+              <a:lnSpc>
+                <a:spcPct val="90000"/>
+              </a:lnSpc>
+              <a:spcBef>
+                <a:spcPts val="200"/>
+              </a:spcBef>
+              <a:spcAft>
+                <a:spcPts val="400"/>
+              </a:spcAft>
+              <a:buClr>
+                <a:schemeClr val="accent1"/>
+              </a:buClr>
+              <a:buSzPct val="80000"/>
+              <a:buFont typeface="Corbel" pitchFamily="34" charset="0"/>
+              <a:buChar char="•"/>
+              <a:defRPr sz="1600" kern="1200">
+                <a:solidFill>
+                  <a:schemeClr val="accent1"/>
+                </a:solidFill>
+                <a:latin typeface="+mn-lt"/>
+                <a:ea typeface="+mn-ea"/>
+                <a:cs typeface="+mn-cs"/>
+              </a:defRPr>
+            </a:lvl5pPr>
+            <a:lvl6pPr marL="1600000" indent="-228600" algn="l" defTabSz="914400" rtl="0" eaLnBrk="1" latinLnBrk="0" hangingPunct="1">
+              <a:lnSpc>
+                <a:spcPct val="90000"/>
+              </a:lnSpc>
+              <a:spcBef>
+                <a:spcPts val="200"/>
+              </a:spcBef>
+              <a:spcAft>
+                <a:spcPts val="400"/>
+              </a:spcAft>
+              <a:buClr>
+                <a:schemeClr val="accent1"/>
+              </a:buClr>
+              <a:buSzPct val="80000"/>
+              <a:buFont typeface="Corbel" pitchFamily="34" charset="0"/>
+              <a:buChar char="•"/>
+              <a:defRPr sz="1600" kern="1200">
+                <a:solidFill>
+                  <a:schemeClr val="accent1"/>
+                </a:solidFill>
+                <a:latin typeface="+mn-lt"/>
+                <a:ea typeface="+mn-ea"/>
+                <a:cs typeface="+mn-cs"/>
+              </a:defRPr>
+            </a:lvl6pPr>
+            <a:lvl7pPr marL="1900000" indent="-228600" algn="l" defTabSz="914400" rtl="0" eaLnBrk="1" latinLnBrk="0" hangingPunct="1">
+              <a:lnSpc>
+                <a:spcPct val="90000"/>
+              </a:lnSpc>
+              <a:spcBef>
+                <a:spcPts val="200"/>
+              </a:spcBef>
+              <a:spcAft>
+                <a:spcPts val="400"/>
+              </a:spcAft>
+              <a:buClr>
+                <a:schemeClr val="accent1"/>
+              </a:buClr>
+              <a:buSzPct val="80000"/>
+              <a:buFont typeface="Corbel" pitchFamily="34" charset="0"/>
+              <a:buChar char="•"/>
+              <a:defRPr sz="1600" kern="1200">
+                <a:solidFill>
+                  <a:schemeClr val="accent1"/>
+                </a:solidFill>
+                <a:latin typeface="+mn-lt"/>
+                <a:ea typeface="+mn-ea"/>
+                <a:cs typeface="+mn-cs"/>
+              </a:defRPr>
+            </a:lvl7pPr>
+            <a:lvl8pPr marL="2200000" indent="-228600" algn="l" defTabSz="914400" rtl="0" eaLnBrk="1" latinLnBrk="0" hangingPunct="1">
+              <a:lnSpc>
+                <a:spcPct val="90000"/>
+              </a:lnSpc>
+              <a:spcBef>
+                <a:spcPts val="200"/>
+              </a:spcBef>
+              <a:spcAft>
+                <a:spcPts val="400"/>
+              </a:spcAft>
+              <a:buClr>
+                <a:schemeClr val="accent1"/>
+              </a:buClr>
+              <a:buSzPct val="80000"/>
+              <a:buFont typeface="Corbel" pitchFamily="34" charset="0"/>
+              <a:buChar char="•"/>
+              <a:defRPr sz="1600" kern="1200">
+                <a:solidFill>
+                  <a:schemeClr val="accent1"/>
+                </a:solidFill>
+                <a:latin typeface="+mn-lt"/>
+                <a:ea typeface="+mn-ea"/>
+                <a:cs typeface="+mn-cs"/>
+              </a:defRPr>
+            </a:lvl8pPr>
+            <a:lvl9pPr marL="2500000" indent="-228600" algn="l" defTabSz="914400" rtl="0" eaLnBrk="1" latinLnBrk="0" hangingPunct="1">
+              <a:lnSpc>
+                <a:spcPct val="90000"/>
+              </a:lnSpc>
+              <a:spcBef>
+                <a:spcPts val="200"/>
+              </a:spcBef>
+              <a:spcAft>
+                <a:spcPts val="400"/>
+              </a:spcAft>
+              <a:buClr>
+                <a:schemeClr val="accent1"/>
+              </a:buClr>
+              <a:buSzPct val="80000"/>
+              <a:buFont typeface="Corbel" pitchFamily="34" charset="0"/>
+              <a:buChar char="•"/>
+              <a:defRPr sz="1600" kern="1200">
+                <a:solidFill>
+                  <a:schemeClr val="accent1"/>
+                </a:solidFill>
+                <a:latin typeface="+mn-lt"/>
+                <a:ea typeface="+mn-ea"/>
+                <a:cs typeface="+mn-cs"/>
+              </a:defRPr>
+            </a:lvl9pPr>
+          </a:lstStyle>
+          <a:p>
+            <a:r>
+              <a:rPr lang="en-US" dirty="0"/>
+              <a:t>Shared lists </a:t>
+            </a:r>
+          </a:p>
+          <a:p>
+            <a:r>
+              <a:rPr lang="en-US" dirty="0"/>
+              <a:t>Products and prices have to be added manually</a:t>
+            </a:r>
+          </a:p>
+        </p:txBody>
+      </p:sp>
+      <p:sp>
+        <p:nvSpPr>
+          <p:cNvPr id="10" name="Textfeld 9"/>
+          <p:cNvSpPr txBox="1"/>
+          <p:nvPr/>
+        </p:nvSpPr>
+        <p:spPr>
+          <a:xfrm rot="20345954">
+            <a:off x="6168769" y="4432275"/>
+            <a:ext cx="5175933" cy="646331"/>
+          </a:xfrm>
+          <a:prstGeom prst="rect">
+            <a:avLst/>
+          </a:prstGeom>
+          <a:noFill/>
+        </p:spPr>
+        <p:txBody>
+          <a:bodyPr wrap="square" rtlCol="0">
+            <a:spAutoFit/>
+          </a:bodyPr>
+          <a:lstStyle/>
+          <a:p>
+            <a:r>
+              <a:rPr lang="de-DE" sz="3600" dirty="0">
+                <a:solidFill>
+                  <a:srgbClr val="FF0000"/>
+                </a:solidFill>
+                <a:effectLst>
+                  <a:outerShdw blurRad="38100" dist="38100" dir="2700000" algn="tl">
+                    <a:srgbClr val="000000">
+                      <a:alpha val="43137"/>
+                    </a:srgbClr>
+                  </a:outerShdw>
+                </a:effectLst>
+              </a:rPr>
+              <a:t>NO SPECIAL OFFERS</a:t>
+            </a:r>
+          </a:p>
+        </p:txBody>
+      </p:sp>
     </p:spTree>
     <p:extLst>
       <p:ext uri="{BB962C8B-B14F-4D97-AF65-F5344CB8AC3E}">
-        <p14:creationId xmlns:p14="http://schemas.microsoft.com/office/powerpoint/2010/main" val="1597652902"/>
+        <p14:creationId xmlns:p14="http://schemas.microsoft.com/office/powerpoint/2010/main" val="4251344815"/>
       </p:ext>
     </p:extLst>
   </p:cSld>
@@ -3719,7 +4260,10 @@
           <a:bodyPr/>
           <a:lstStyle/>
           <a:p>
-            <a:endParaRPr lang="de-DE"/>
+            <a:r>
+              <a:rPr lang="en-US" dirty="0"/>
+              <a:t>Special offer Apps</a:t>
+            </a:r>
           </a:p>
         </p:txBody>
       </p:sp>
@@ -3736,20 +4280,33 @@
         <p:spPr>
           <a:xfrm>
             <a:off x="1143000" y="2001511"/>
-            <a:ext cx="7296150" cy="756000"/>
+            <a:ext cx="4699000" cy="756000"/>
           </a:xfrm>
         </p:spPr>
         <p:txBody>
           <a:bodyPr/>
           <a:lstStyle/>
           <a:p>
-            <a:endParaRPr lang="de-DE" dirty="0">
-              <a:solidFill>
-                <a:schemeClr val="accent4">
-                  <a:lumMod val="75000"/>
-                </a:schemeClr>
-              </a:solidFill>
-            </a:endParaRPr>
+            <a:r>
+              <a:rPr lang="en-US" dirty="0" err="1">
+                <a:solidFill>
+                  <a:schemeClr val="accent4">
+                    <a:lumMod val="75000"/>
+                  </a:schemeClr>
+                </a:solidFill>
+              </a:rPr>
+              <a:t>Marktguru</a:t>
+            </a:r>
+            <a:r>
+              <a:rPr lang="en-US" dirty="0">
+                <a:solidFill>
+                  <a:schemeClr val="accent4">
+                    <a:lumMod val="75000"/>
+                  </a:schemeClr>
+                </a:solidFill>
+              </a:rPr>
+              <a:t> </a:t>
+            </a:r>
           </a:p>
         </p:txBody>
       </p:sp>
@@ -3766,68 +4323,37 @@
         <p:spPr>
           <a:xfrm>
             <a:off x="1143000" y="2721483"/>
-            <a:ext cx="8210550" cy="1332000"/>
+            <a:ext cx="7780867" cy="3255984"/>
           </a:xfrm>
         </p:spPr>
         <p:txBody>
-          <a:bodyPr/>
-          <a:lstStyle/>
-          <a:p>
-            <a:endParaRPr lang="de-DE" dirty="0"/>
-          </a:p>
-        </p:txBody>
-      </p:sp>
-      <p:sp>
-        <p:nvSpPr>
-          <p:cNvPr id="5" name="Textplatzhalter 4"/>
-          <p:cNvSpPr>
-            <a:spLocks noGrp="1"/>
-          </p:cNvSpPr>
-          <p:nvPr>
-            <p:ph type="body" sz="quarter" idx="3"/>
-          </p:nvPr>
-        </p:nvSpPr>
-        <p:spPr>
-          <a:xfrm>
-            <a:off x="1143000" y="4395455"/>
-            <a:ext cx="7296150" cy="756000"/>
-          </a:xfrm>
-        </p:spPr>
-        <p:txBody>
-          <a:bodyPr/>
-          <a:lstStyle/>
-          <a:p>
-            <a:endParaRPr lang="de-DE" dirty="0">
-              <a:solidFill>
-                <a:schemeClr val="accent4">
-                  <a:lumMod val="75000"/>
-                </a:schemeClr>
-              </a:solidFill>
-            </a:endParaRPr>
-          </a:p>
-        </p:txBody>
-      </p:sp>
-      <p:sp>
-        <p:nvSpPr>
-          <p:cNvPr id="6" name="Inhaltsplatzhalter 5"/>
-          <p:cNvSpPr>
-            <a:spLocks noGrp="1"/>
-          </p:cNvSpPr>
-          <p:nvPr>
-            <p:ph sz="quarter" idx="4"/>
-          </p:nvPr>
-        </p:nvSpPr>
-        <p:spPr>
-          <a:xfrm>
-            <a:off x="1143000" y="5115425"/>
-            <a:ext cx="8210550" cy="1332000"/>
-          </a:xfrm>
-        </p:spPr>
-        <p:txBody>
-          <a:bodyPr/>
-          <a:lstStyle/>
-          <a:p>
-            <a:endParaRPr lang="de-DE" dirty="0"/>
+          <a:bodyPr>
+            <a:normAutofit/>
+          </a:bodyPr>
+          <a:lstStyle/>
+          <a:p>
+            <a:r>
+              <a:rPr lang="en-US" dirty="0"/>
+              <a:t>Brings pdf leaflets of local shops to your smartphone</a:t>
+            </a:r>
+          </a:p>
+          <a:p>
+            <a:r>
+              <a:rPr lang="en-US" dirty="0"/>
+              <a:t>No maturity, wrong search results</a:t>
+            </a:r>
+          </a:p>
+          <a:p>
+            <a:r>
+              <a:rPr lang="en-US" dirty="0"/>
+              <a:t>Presented offers are furniture, technical devices e.g. TVs.. </a:t>
+            </a:r>
+          </a:p>
+          <a:p>
+            <a:r>
+              <a:rPr lang="en-US" dirty="0"/>
+              <a:t>Sharing via external Apps</a:t>
+            </a:r>
           </a:p>
         </p:txBody>
       </p:sp>
@@ -3879,10 +4405,90 @@
           </a:extLst>
         </p:spPr>
       </p:pic>
+      <p:sp>
+        <p:nvSpPr>
+          <p:cNvPr id="13" name="Textfeld 12"/>
+          <p:cNvSpPr txBox="1"/>
+          <p:nvPr/>
+        </p:nvSpPr>
+        <p:spPr>
+          <a:xfrm rot="20345954">
+            <a:off x="7386874" y="3870343"/>
+            <a:ext cx="5175933" cy="646331"/>
+          </a:xfrm>
+          <a:prstGeom prst="rect">
+            <a:avLst/>
+          </a:prstGeom>
+          <a:noFill/>
+        </p:spPr>
+        <p:txBody>
+          <a:bodyPr wrap="square" rtlCol="0">
+            <a:spAutoFit/>
+          </a:bodyPr>
+          <a:lstStyle/>
+          <a:p>
+            <a:r>
+              <a:rPr lang="de-DE" sz="3600" dirty="0">
+                <a:solidFill>
+                  <a:srgbClr val="FF0000"/>
+                </a:solidFill>
+                <a:effectLst>
+                  <a:outerShdw blurRad="38100" dist="38100" dir="2700000" algn="tl">
+                    <a:srgbClr val="000000">
+                      <a:alpha val="43137"/>
+                    </a:srgbClr>
+                  </a:outerShdw>
+                </a:effectLst>
+              </a:rPr>
+              <a:t>NO PLANING</a:t>
+            </a:r>
+          </a:p>
+        </p:txBody>
+      </p:sp>
+      <p:sp>
+        <p:nvSpPr>
+          <p:cNvPr id="14" name="Textfeld 13"/>
+          <p:cNvSpPr txBox="1"/>
+          <p:nvPr/>
+        </p:nvSpPr>
+        <p:spPr>
+          <a:xfrm rot="20345954">
+            <a:off x="7928740" y="1296591"/>
+            <a:ext cx="5175933" cy="646331"/>
+          </a:xfrm>
+          <a:prstGeom prst="rect">
+            <a:avLst/>
+          </a:prstGeom>
+          <a:noFill/>
+        </p:spPr>
+        <p:txBody>
+          <a:bodyPr wrap="square" rtlCol="0">
+            <a:spAutoFit/>
+          </a:bodyPr>
+          <a:lstStyle/>
+          <a:p>
+            <a:r>
+              <a:rPr lang="de-DE" sz="3600" dirty="0">
+                <a:solidFill>
+                  <a:srgbClr val="FF0000"/>
+                </a:solidFill>
+                <a:effectLst>
+                  <a:outerShdw blurRad="38100" dist="38100" dir="2700000" algn="tl">
+                    <a:srgbClr val="000000">
+                      <a:alpha val="43137"/>
+                    </a:srgbClr>
+                  </a:outerShdw>
+                </a:effectLst>
+              </a:rPr>
+              <a:t>NO OPTIMIZATION</a:t>
+            </a:r>
+          </a:p>
+        </p:txBody>
+      </p:sp>
     </p:spTree>
     <p:extLst>
       <p:ext uri="{BB962C8B-B14F-4D97-AF65-F5344CB8AC3E}">
-        <p14:creationId xmlns:p14="http://schemas.microsoft.com/office/powerpoint/2010/main" val="4251344815"/>
+        <p14:creationId xmlns:p14="http://schemas.microsoft.com/office/powerpoint/2010/main" val="471425877"/>
       </p:ext>
     </p:extLst>
   </p:cSld>

</xml_diff>